<commit_message>
editing the research questions, adding the Rcode and variable visualizatios
</commit_message>
<xml_diff>
--- a/RQ&Variables/reseach_question_presentation_template.pptx
+++ b/RQ&Variables/reseach_question_presentation_template.pptx
@@ -254,7 +254,7 @@
             <a:fld id="{93FAAC3A-BD1F-4A00-9099-74B95789FE00}" type="datetimeFigureOut">
               <a:rPr lang="en-GB" smtClean="0"/>
               <a:pPr/>
-              <a:t>30/10/2024</a:t>
+              <a:t>17/11/2024</a:t>
             </a:fld>
             <a:endParaRPr lang="en-GB"/>
           </a:p>
@@ -433,7 +433,7 @@
             <a:fld id="{8E359C8A-39F6-4045-9163-4042C4C26B15}" type="datetimeFigureOut">
               <a:rPr lang="en-GB" smtClean="0"/>
               <a:pPr/>
-              <a:t>30/10/2024</a:t>
+              <a:t>17/11/2024</a:t>
             </a:fld>
             <a:endParaRPr lang="en-GB"/>
           </a:p>
@@ -4918,15 +4918,7 @@
                   <a:srgbClr val="203232"/>
                 </a:solidFill>
               </a:rPr>
-              <a:t>ID</a:t>
-            </a:r>
-            <a:r>
-              <a:rPr lang="en-US" sz="1600" dirty="0">
-                <a:solidFill>
-                  <a:srgbClr val="FF0000"/>
-                </a:solidFill>
-              </a:rPr>
-              <a:t>: DS324 NBA Stat Projections for 2019-2020 Season</a:t>
+              <a:t>ID: DS324</a:t>
             </a:r>
             <a:endParaRPr lang="en-US" sz="2400" dirty="0">
               <a:solidFill>
@@ -5150,7 +5142,7 @@
                 <a:latin typeface="Calibri"/>
                 <a:cs typeface="Calibri"/>
               </a:rPr>
-              <a:t>This dataset is interesting to us because it provides projected performance statistics for NBA players, which can be used to predict fantasy basketball points and draft strategies.</a:t>
+              <a:t>This dataset enables us to quantify player contributions beyond scoring, offering insights into offensive dynamics like assists and their impact on team performance.</a:t>
             </a:r>
             <a:br>
               <a:rPr lang="en-US" sz="2400" b="0" dirty="0">
@@ -5169,7 +5161,7 @@
                 <a:latin typeface="Calibri"/>
                 <a:cs typeface="Calibri"/>
               </a:rPr>
-              <a:t>Our  Independent variable is: PTS (Points)</a:t>
+              <a:t>Our  Independent variable is: Assists (AST)</a:t>
             </a:r>
             <a:br>
               <a:rPr lang="en-US" sz="2400" b="0" dirty="0">
@@ -5179,33 +5171,10 @@
             </a:br>
             <a:r>
               <a:rPr lang="en-US" sz="2400" b="0" dirty="0">
-                <a:solidFill>
-                  <a:srgbClr val="FF0000"/>
-                </a:solidFill>
                 <a:latin typeface="Calibri"/>
                 <a:cs typeface="Calibri"/>
               </a:rPr>
-              <a:t>                   </a:t>
-            </a:r>
-            <a:r>
-              <a:rPr lang="en-US" sz="2400" b="0" dirty="0">
-                <a:latin typeface="Calibri"/>
-                <a:cs typeface="Calibri"/>
-              </a:rPr>
-              <a:t>This  Independent variable datatype is (select one):  3PM (Three-point Shots Made)</a:t>
-            </a:r>
-            <a:br>
-              <a:rPr lang="en-US" sz="2400" b="0" dirty="0">
-                <a:latin typeface="Calibri" panose="020F0502020204030204" pitchFamily="34" charset="0"/>
-                <a:cs typeface="Calibri" panose="020F0502020204030204" pitchFamily="34" charset="0"/>
-              </a:rPr>
-            </a:br>
-            <a:r>
-              <a:rPr lang="en-US" sz="2400" b="0" dirty="0">
-                <a:latin typeface="Calibri"/>
-                <a:cs typeface="Calibri"/>
-              </a:rPr>
-              <a:t>Our Dependent variable is: FPTS (Fantasy Points, if calculated)</a:t>
+              <a:t>Our Dependent variable is: Points (PTS)</a:t>
             </a:r>
             <a:br>
               <a:rPr lang="en-US" sz="2400" b="0" dirty="0">
@@ -5223,13 +5192,10 @@
               </a:rPr>
               <a:t>                   </a:t>
             </a:r>
-            <a:r>
-              <a:rPr lang="en-US" sz="2400" b="0" dirty="0">
-                <a:latin typeface="Calibri"/>
-                <a:cs typeface="Calibri"/>
-              </a:rPr>
-              <a:t>This Dependent variable datatype is  (select one): STL (Steals)</a:t>
-            </a:r>
+            <a:endParaRPr lang="en-US" sz="2400" b="0" dirty="0">
+              <a:latin typeface="Calibri"/>
+              <a:cs typeface="Calibri"/>
+            </a:endParaRPr>
           </a:p>
         </p:txBody>
       </p:sp>
@@ -5447,7 +5413,7 @@
                 <a:ea typeface="Calibri" panose="020F0502020204030204" pitchFamily="34" charset="0"/>
                 <a:cs typeface="Times New Roman" panose="02020603050405020304" pitchFamily="18" charset="0"/>
               </a:rPr>
-              <a:t>Is there a correlation between Fantasy Points (FPTS) and Points Scored (PTS) for NBA players?</a:t>
+              <a:t>Is there a correlation between assists (AST) and points scored (PTS) in NBA players during the 2018–2019 season?</a:t>
             </a:r>
             <a:r>
               <a:rPr lang="en-IE" sz="2400" b="0" dirty="0">
@@ -5478,23 +5444,6 @@
                 <a:cs typeface="Times New Roman" panose="02020603050405020304" pitchFamily="18" charset="0"/>
               </a:rPr>
             </a:br>
-            <a:br>
-              <a:rPr lang="en-IE" sz="2400" dirty="0">
-                <a:effectLst/>
-                <a:latin typeface="Calibri" panose="020F0502020204030204" pitchFamily="34" charset="0"/>
-                <a:ea typeface="Calibri" panose="020F0502020204030204" pitchFamily="34" charset="0"/>
-                <a:cs typeface="Times New Roman" panose="02020603050405020304" pitchFamily="18" charset="0"/>
-              </a:rPr>
-            </a:br>
-            <a:r>
-              <a:rPr lang="en-US" sz="2400" dirty="0">
-                <a:effectLst/>
-                <a:latin typeface="Calibri" panose="020F0502020204030204" pitchFamily="34" charset="0"/>
-                <a:ea typeface="Calibri" panose="020F0502020204030204" pitchFamily="34" charset="0"/>
-                <a:cs typeface="Times New Roman" panose="02020603050405020304" pitchFamily="18" charset="0"/>
-              </a:rPr>
-              <a:t>This approach (Template 1) allows you to test if there is a statistically significant relationship between the Points Scored (PTS), an independent interval variable, and Fantasy Points (FPTS), a dependent interval variable. By using correlation analysis (e.g., Pearson's correlation), you can examine if higher points scored generally lead to higher fantasy points.</a:t>
-            </a:r>
             <a:br>
               <a:rPr lang="en-GB" sz="2400" dirty="0">
                 <a:effectLst/>
@@ -5762,88 +5711,6 @@
       </p:grpSpPr>
       <p:sp>
         <p:nvSpPr>
-          <p:cNvPr id="2" name="Subtitle 1">
-            <a:extLst>
-              <a:ext uri="{FF2B5EF4-FFF2-40B4-BE49-F238E27FC236}">
-                <a16:creationId xmlns:a16="http://schemas.microsoft.com/office/drawing/2014/main" id="{6B64221B-D6D4-E382-A91A-99FF908D5475}"/>
-              </a:ext>
-            </a:extLst>
-          </p:cNvPr>
-          <p:cNvSpPr>
-            <a:spLocks noGrp="1"/>
-          </p:cNvSpPr>
-          <p:nvPr>
-            <p:ph type="subTitle" idx="1"/>
-          </p:nvPr>
-        </p:nvSpPr>
-        <p:spPr>
-          <a:xfrm>
-            <a:off x="521219" y="394997"/>
-            <a:ext cx="10406581" cy="1391600"/>
-          </a:xfrm>
-        </p:spPr>
-        <p:txBody>
-          <a:bodyPr vert="horz" lIns="0" tIns="0" rIns="0" bIns="0" rtlCol="0" anchor="t">
-            <a:noAutofit/>
-          </a:bodyPr>
-          <a:lstStyle/>
-          <a:p>
-            <a:pPr>
-              <a:lnSpc>
-                <a:spcPct val="100000"/>
-              </a:lnSpc>
-            </a:pPr>
-            <a:r>
-              <a:rPr lang="en-GB" sz="2400" b="0" dirty="0">
-                <a:latin typeface="Calibri"/>
-                <a:cs typeface="Calibri"/>
-              </a:rPr>
-              <a:t>Add your </a:t>
-            </a:r>
-            <a:r>
-              <a:rPr lang="en-GB" sz="2400" dirty="0">
-                <a:latin typeface="Calibri"/>
-                <a:cs typeface="Calibri"/>
-              </a:rPr>
-              <a:t>hypotheses</a:t>
-            </a:r>
-            <a:r>
-              <a:rPr lang="en-GB" sz="2400" b="0" dirty="0">
-                <a:latin typeface="Calibri"/>
-                <a:cs typeface="Calibri"/>
-              </a:rPr>
-              <a:t> to the previous RQ Slide  (both the Null and Alternative Hypotheses).  Here are definitions and examples. Your wording will come directly from your RQ. This is the formal way of reporting the results of your inferential statistics,  in which we report the </a:t>
-            </a:r>
-            <a:r>
-              <a:rPr lang="en-GB" sz="2400" b="0" i="1" dirty="0">
-                <a:latin typeface="Calibri"/>
-                <a:cs typeface="Calibri"/>
-              </a:rPr>
-              <a:t>effect</a:t>
-            </a:r>
-            <a:r>
-              <a:rPr lang="en-GB" sz="2400" b="0" dirty="0">
-                <a:latin typeface="Calibri"/>
-                <a:cs typeface="Calibri"/>
-              </a:rPr>
-              <a:t> the independent variable has on the dependent variable – </a:t>
-            </a:r>
-          </a:p>
-          <a:p>
-            <a:pPr>
-              <a:lnSpc>
-                <a:spcPct val="100000"/>
-              </a:lnSpc>
-            </a:pPr>
-            <a:endParaRPr lang="en-GB" sz="2400" b="0" dirty="0">
-              <a:latin typeface="Arial"/>
-              <a:cs typeface="Arial"/>
-            </a:endParaRPr>
-          </a:p>
-        </p:txBody>
-      </p:sp>
-      <p:sp>
-        <p:nvSpPr>
           <p:cNvPr id="4" name="Slide Number Placeholder 3">
             <a:extLst>
               <a:ext uri="{FF2B5EF4-FFF2-40B4-BE49-F238E27FC236}">
@@ -5939,7 +5806,7 @@
                 </a:solidFill>
                 <a:latin typeface="+mn-lt"/>
               </a:rPr>
-              <a:t>There is no correlation between Fantasy Points (FPTS) and Points Scored (PTS) for NBA players.</a:t>
+              <a:t>There is no correlation between assists (AST) and points scored (PTS).</a:t>
             </a:r>
             <a:br>
               <a:rPr lang="en-US" sz="2000" b="0" spc="0" dirty="0">
@@ -5986,7 +5853,7 @@
                 </a:solidFill>
                 <a:latin typeface="+mn-lt"/>
               </a:rPr>
-              <a:t>There is no correlation between Fantasy Points (FPTS) and Points Scored (PTS) for NBA players.</a:t>
+              <a:t>There is a correlation between assists (AST) and points scored (PTS).</a:t>
             </a:r>
             <a:endParaRPr lang="en-GB" sz="2000" b="0" dirty="0">
               <a:solidFill>
@@ -5998,87 +5865,34 @@
       </p:sp>
       <p:sp>
         <p:nvSpPr>
-          <p:cNvPr id="6" name="TextBox 5">
+          <p:cNvPr id="5" name="Subtitle 4">
             <a:extLst>
               <a:ext uri="{FF2B5EF4-FFF2-40B4-BE49-F238E27FC236}">
-                <a16:creationId xmlns:a16="http://schemas.microsoft.com/office/drawing/2014/main" id="{1841CE34-1B2E-88D5-0C3F-506E8C37BB7B}"/>
+                <a16:creationId xmlns:a16="http://schemas.microsoft.com/office/drawing/2014/main" id="{9A6CCBAB-8E92-9C5D-74D8-A03E8DEFDE34}"/>
               </a:ext>
             </a:extLst>
           </p:cNvPr>
-          <p:cNvSpPr txBox="1"/>
-          <p:nvPr/>
+          <p:cNvSpPr>
+            <a:spLocks noGrp="1"/>
+          </p:cNvSpPr>
+          <p:nvPr>
+            <p:ph type="subTitle" idx="1"/>
+          </p:nvPr>
         </p:nvSpPr>
         <p:spPr>
           <a:xfrm>
-            <a:off x="3356146" y="5298491"/>
-            <a:ext cx="7811780" cy="1477328"/>
+            <a:off x="387061" y="896561"/>
+            <a:ext cx="7200000" cy="360000"/>
           </a:xfrm>
-          <a:prstGeom prst="rect">
-            <a:avLst/>
-          </a:prstGeom>
-          <a:noFill/>
         </p:spPr>
         <p:txBody>
-          <a:bodyPr wrap="square" lIns="91440" tIns="45720" rIns="91440" bIns="45720" anchor="t">
-            <a:spAutoFit/>
-          </a:bodyPr>
+          <a:bodyPr/>
           <a:lstStyle/>
           <a:p>
             <a:r>
-              <a:rPr lang="en-GB" dirty="0"/>
-              <a:t>L</a:t>
+              <a:rPr lang="en-US" dirty="0"/>
+              <a:t>Hypothesis:</a:t>
             </a:r>
-            <a:r>
-              <a:rPr lang="en-GB" sz="1800" b="0" dirty="0"/>
-              <a:t>eave the hypotheses as </a:t>
-            </a:r>
-            <a:r>
-              <a:rPr lang="en-GB" dirty="0"/>
-              <a:t>two </a:t>
-            </a:r>
-            <a:r>
-              <a:rPr lang="en-GB" sz="1800" b="0" dirty="0"/>
-              <a:t>statements for now – after your </a:t>
-            </a:r>
-            <a:r>
-              <a:rPr lang="en-GB" dirty="0"/>
-              <a:t>statistical </a:t>
-            </a:r>
-            <a:r>
-              <a:rPr lang="en-GB" sz="1800" b="0" dirty="0"/>
-              <a:t>analysis </a:t>
-            </a:r>
-            <a:r>
-              <a:rPr lang="en-GB" dirty="0"/>
-              <a:t>test, </a:t>
-            </a:r>
-            <a:r>
-              <a:rPr lang="en-GB" sz="1800" b="0" dirty="0"/>
-              <a:t>you </a:t>
-            </a:r>
-            <a:r>
-              <a:rPr lang="en-GB" dirty="0"/>
-              <a:t>will </a:t>
-            </a:r>
-            <a:r>
-              <a:rPr lang="en-GB" sz="1800" b="0" dirty="0"/>
-              <a:t>choose one or the other.</a:t>
-            </a:r>
-            <a:r>
-              <a:rPr lang="en-GB" dirty="0"/>
-              <a:t> (</a:t>
-            </a:r>
-            <a:r>
-              <a:rPr lang="en-GB" i="1" dirty="0"/>
-              <a:t>You will report: "We fail to reject the null hypothesis" with no significant result, or if you do have significance [p-value = &lt; 0.05] you can state "We reject the null hypothesis".   More guidance on hypothesis testing is given in the lectures</a:t>
-            </a:r>
-            <a:r>
-              <a:rPr lang="en-GB" dirty="0"/>
-              <a:t>.)</a:t>
-            </a:r>
-            <a:endParaRPr lang="en-GB" dirty="0">
-              <a:cs typeface="Arial"/>
-            </a:endParaRPr>
           </a:p>
         </p:txBody>
       </p:sp>
@@ -6114,6 +5928,35 @@
       </p:grpSpPr>
       <p:sp>
         <p:nvSpPr>
+          <p:cNvPr id="3" name="Footer Placeholder 2">
+            <a:extLst>
+              <a:ext uri="{FF2B5EF4-FFF2-40B4-BE49-F238E27FC236}">
+                <a16:creationId xmlns:a16="http://schemas.microsoft.com/office/drawing/2014/main" id="{1E32129C-44C2-95DE-7FB4-8025AAB3EA1F}"/>
+              </a:ext>
+            </a:extLst>
+          </p:cNvPr>
+          <p:cNvSpPr>
+            <a:spLocks noGrp="1"/>
+          </p:cNvSpPr>
+          <p:nvPr>
+            <p:ph type="ftr" sz="quarter" idx="11"/>
+          </p:nvPr>
+        </p:nvSpPr>
+        <p:spPr/>
+        <p:txBody>
+          <a:bodyPr/>
+          <a:lstStyle/>
+          <a:p>
+            <a:r>
+              <a:rPr lang="en-US" dirty="0"/>
+              <a:t>Dataset:</a:t>
+            </a:r>
+            <a:endParaRPr lang="en-GB" dirty="0"/>
+          </a:p>
+        </p:txBody>
+      </p:sp>
+      <p:sp>
+        <p:nvSpPr>
           <p:cNvPr id="4" name="Slide Number Placeholder 3">
             <a:extLst>
               <a:ext uri="{FF2B5EF4-FFF2-40B4-BE49-F238E27FC236}">
@@ -6142,40 +5985,6 @@
           </a:p>
         </p:txBody>
       </p:sp>
-      <p:sp>
-        <p:nvSpPr>
-          <p:cNvPr id="5" name="Title 4">
-            <a:extLst>
-              <a:ext uri="{FF2B5EF4-FFF2-40B4-BE49-F238E27FC236}">
-                <a16:creationId xmlns:a16="http://schemas.microsoft.com/office/drawing/2014/main" id="{FEF2E89F-D251-B0A8-2377-FD314948D49C}"/>
-              </a:ext>
-            </a:extLst>
-          </p:cNvPr>
-          <p:cNvSpPr>
-            <a:spLocks noGrp="1"/>
-          </p:cNvSpPr>
-          <p:nvPr>
-            <p:ph type="ctrTitle"/>
-          </p:nvPr>
-        </p:nvSpPr>
-        <p:spPr>
-          <a:xfrm>
-            <a:off x="896643" y="402631"/>
-            <a:ext cx="10031157" cy="2160000"/>
-          </a:xfrm>
-        </p:spPr>
-        <p:txBody>
-          <a:bodyPr/>
-          <a:lstStyle/>
-          <a:p>
-            <a:r>
-              <a:rPr lang="en-US" dirty="0"/>
-              <a:t>Dataset</a:t>
-            </a:r>
-            <a:endParaRPr lang="en-GB" dirty="0"/>
-          </a:p>
-        </p:txBody>
-      </p:sp>
       <p:graphicFrame>
         <p:nvGraphicFramePr>
           <p:cNvPr id="6" name="Table 5">
@@ -6191,112 +6000,112 @@
           <p:nvPr>
             <p:extLst>
               <p:ext uri="{D42A27DB-BD31-4B8C-83A1-F6EECF244321}">
-                <p14:modId xmlns:p14="http://schemas.microsoft.com/office/powerpoint/2010/main" val="2037793708"/>
+                <p14:modId xmlns:p14="http://schemas.microsoft.com/office/powerpoint/2010/main" val="2756577147"/>
               </p:ext>
             </p:extLst>
           </p:nvPr>
         </p:nvGraphicFramePr>
         <p:xfrm>
-          <a:off x="3583072" y="1482631"/>
-          <a:ext cx="5871464" cy="4225475"/>
+          <a:off x="3261866" y="791022"/>
+          <a:ext cx="6788474" cy="4719446"/>
         </p:xfrm>
         <a:graphic>
           <a:graphicData uri="http://schemas.openxmlformats.org/drawingml/2006/table">
             <a:tbl>
               <a:tblPr/>
               <a:tblGrid>
-                <a:gridCol w="1619712">
+                <a:gridCol w="1872680">
                   <a:extLst>
                     <a:ext uri="{9D8B030D-6E8A-4147-A177-3AD203B41FA5}">
                       <a16:colId xmlns:a16="http://schemas.microsoft.com/office/drawing/2014/main" val="663197396"/>
                     </a:ext>
                   </a:extLst>
                 </a:gridCol>
-                <a:gridCol w="386240">
+                <a:gridCol w="446563">
                   <a:extLst>
                     <a:ext uri="{9D8B030D-6E8A-4147-A177-3AD203B41FA5}">
                       <a16:colId xmlns:a16="http://schemas.microsoft.com/office/drawing/2014/main" val="2114237348"/>
                     </a:ext>
                   </a:extLst>
                 </a:gridCol>
-                <a:gridCol w="598047">
+                <a:gridCol w="691451">
                   <a:extLst>
                     <a:ext uri="{9D8B030D-6E8A-4147-A177-3AD203B41FA5}">
                       <a16:colId xmlns:a16="http://schemas.microsoft.com/office/drawing/2014/main" val="1846339655"/>
                     </a:ext>
                   </a:extLst>
                 </a:gridCol>
-                <a:gridCol w="327058">
+                <a:gridCol w="378138">
                   <a:extLst>
                     <a:ext uri="{9D8B030D-6E8A-4147-A177-3AD203B41FA5}">
                       <a16:colId xmlns:a16="http://schemas.microsoft.com/office/drawing/2014/main" val="2838040512"/>
                     </a:ext>
                   </a:extLst>
                 </a:gridCol>
-                <a:gridCol w="327058">
+                <a:gridCol w="378138">
                   <a:extLst>
                     <a:ext uri="{9D8B030D-6E8A-4147-A177-3AD203B41FA5}">
                       <a16:colId xmlns:a16="http://schemas.microsoft.com/office/drawing/2014/main" val="1165611066"/>
                     </a:ext>
                   </a:extLst>
                 </a:gridCol>
-                <a:gridCol w="286565">
+                <a:gridCol w="331321">
                   <a:extLst>
                     <a:ext uri="{9D8B030D-6E8A-4147-A177-3AD203B41FA5}">
                       <a16:colId xmlns:a16="http://schemas.microsoft.com/office/drawing/2014/main" val="508529011"/>
                     </a:ext>
                   </a:extLst>
                 </a:gridCol>
-                <a:gridCol w="274105">
+                <a:gridCol w="316915">
                   <a:extLst>
                     <a:ext uri="{9D8B030D-6E8A-4147-A177-3AD203B41FA5}">
                       <a16:colId xmlns:a16="http://schemas.microsoft.com/office/drawing/2014/main" val="2575960316"/>
                     </a:ext>
                   </a:extLst>
                 </a:gridCol>
-                <a:gridCol w="261647">
+                <a:gridCol w="302511">
                   <a:extLst>
                     <a:ext uri="{9D8B030D-6E8A-4147-A177-3AD203B41FA5}">
                       <a16:colId xmlns:a16="http://schemas.microsoft.com/office/drawing/2014/main" val="2695131158"/>
                     </a:ext>
                   </a:extLst>
                 </a:gridCol>
-                <a:gridCol w="327058">
+                <a:gridCol w="378138">
                   <a:extLst>
                     <a:ext uri="{9D8B030D-6E8A-4147-A177-3AD203B41FA5}">
                       <a16:colId xmlns:a16="http://schemas.microsoft.com/office/drawing/2014/main" val="2949912909"/>
                     </a:ext>
                   </a:extLst>
                 </a:gridCol>
-                <a:gridCol w="327058">
+                <a:gridCol w="378138">
                   <a:extLst>
                     <a:ext uri="{9D8B030D-6E8A-4147-A177-3AD203B41FA5}">
                       <a16:colId xmlns:a16="http://schemas.microsoft.com/office/drawing/2014/main" val="184149708"/>
                     </a:ext>
                   </a:extLst>
                 </a:gridCol>
-                <a:gridCol w="323942">
+                <a:gridCol w="374536">
                   <a:extLst>
                     <a:ext uri="{9D8B030D-6E8A-4147-A177-3AD203B41FA5}">
                       <a16:colId xmlns:a16="http://schemas.microsoft.com/office/drawing/2014/main" val="1165397716"/>
                     </a:ext>
                   </a:extLst>
                 </a:gridCol>
-                <a:gridCol w="224269">
+                <a:gridCol w="259296">
                   <a:extLst>
                     <a:ext uri="{9D8B030D-6E8A-4147-A177-3AD203B41FA5}">
                       <a16:colId xmlns:a16="http://schemas.microsoft.com/office/drawing/2014/main" val="3837715550"/>
                     </a:ext>
                   </a:extLst>
                 </a:gridCol>
-                <a:gridCol w="327058">
+                <a:gridCol w="378138">
                   <a:extLst>
                     <a:ext uri="{9D8B030D-6E8A-4147-A177-3AD203B41FA5}">
                       <a16:colId xmlns:a16="http://schemas.microsoft.com/office/drawing/2014/main" val="2058770297"/>
                     </a:ext>
                   </a:extLst>
                 </a:gridCol>
-                <a:gridCol w="261647">
+                <a:gridCol w="302511">
                   <a:extLst>
                     <a:ext uri="{9D8B030D-6E8A-4147-A177-3AD203B41FA5}">
                       <a16:colId xmlns:a16="http://schemas.microsoft.com/office/drawing/2014/main" val="1664735735"/>
@@ -6304,7 +6113,7 @@
                   </a:extLst>
                 </a:gridCol>
               </a:tblGrid>
-              <a:tr h="169019">
+              <a:tr h="190029">
                 <a:tc>
                   <a:txBody>
                     <a:bodyPr/>
@@ -6787,7 +6596,7 @@
                   </a:ext>
                 </a:extLst>
               </a:tr>
-              <a:tr h="169019">
+              <a:tr h="190029">
                 <a:tc>
                   <a:txBody>
                     <a:bodyPr/>
@@ -7270,7 +7079,7 @@
                   </a:ext>
                 </a:extLst>
               </a:tr>
-              <a:tr h="169019">
+              <a:tr h="190029">
                 <a:tc>
                   <a:txBody>
                     <a:bodyPr/>
@@ -7753,7 +7562,7 @@
                   </a:ext>
                 </a:extLst>
               </a:tr>
-              <a:tr h="169019">
+              <a:tr h="190029">
                 <a:tc>
                   <a:txBody>
                     <a:bodyPr/>
@@ -8236,7 +8045,7 @@
                   </a:ext>
                 </a:extLst>
               </a:tr>
-              <a:tr h="169019">
+              <a:tr h="190029">
                 <a:tc>
                   <a:txBody>
                     <a:bodyPr/>
@@ -8244,7 +8053,7 @@
                     <a:p>
                       <a:pPr algn="l" fontAlgn="b"/>
                       <a:r>
-                        <a:rPr lang="en-US" sz="1000" b="1" i="0" u="none" strike="noStrike">
+                        <a:rPr lang="en-US" sz="1000" b="1" i="0" u="none" strike="noStrike" dirty="0">
                           <a:solidFill>
                             <a:srgbClr val="000000"/>
                           </a:solidFill>
@@ -8719,7 +8528,7 @@
                   </a:ext>
                 </a:extLst>
               </a:tr>
-              <a:tr h="169019">
+              <a:tr h="190029">
                 <a:tc>
                   <a:txBody>
                     <a:bodyPr/>
@@ -9202,7 +9011,7 @@
                   </a:ext>
                 </a:extLst>
               </a:tr>
-              <a:tr h="169019">
+              <a:tr h="190029">
                 <a:tc>
                   <a:txBody>
                     <a:bodyPr/>
@@ -9210,7 +9019,7 @@
                     <a:p>
                       <a:pPr algn="l" fontAlgn="b"/>
                       <a:r>
-                        <a:rPr lang="en-US" sz="1000" b="1" i="0" u="none" strike="noStrike">
+                        <a:rPr lang="en-US" sz="1000" b="1" i="0" u="none" strike="noStrike" dirty="0">
                           <a:solidFill>
                             <a:srgbClr val="000000"/>
                           </a:solidFill>
@@ -9685,7 +9494,7 @@
                   </a:ext>
                 </a:extLst>
               </a:tr>
-              <a:tr h="169019">
+              <a:tr h="190029">
                 <a:tc>
                   <a:txBody>
                     <a:bodyPr/>
@@ -10168,7 +9977,7 @@
                   </a:ext>
                 </a:extLst>
               </a:tr>
-              <a:tr h="169019">
+              <a:tr h="190029">
                 <a:tc>
                   <a:txBody>
                     <a:bodyPr/>
@@ -10651,7 +10460,7 @@
                   </a:ext>
                 </a:extLst>
               </a:tr>
-              <a:tr h="169019">
+              <a:tr h="0">
                 <a:tc>
                   <a:txBody>
                     <a:bodyPr/>
@@ -10659,7 +10468,7 @@
                     <a:p>
                       <a:pPr algn="l" fontAlgn="b"/>
                       <a:r>
-                        <a:rPr lang="en-US" sz="1000" b="1" i="0" u="none" strike="noStrike">
+                        <a:rPr lang="en-US" sz="1000" b="1" i="0" u="none" strike="noStrike" dirty="0">
                           <a:solidFill>
                             <a:srgbClr val="000000"/>
                           </a:solidFill>
@@ -11134,7 +10943,7 @@
                   </a:ext>
                 </a:extLst>
               </a:tr>
-              <a:tr h="169019">
+              <a:tr h="190029">
                 <a:tc>
                   <a:txBody>
                     <a:bodyPr/>
@@ -11142,7 +10951,7 @@
                     <a:p>
                       <a:pPr algn="l" fontAlgn="b"/>
                       <a:r>
-                        <a:rPr lang="en-US" sz="1000" b="1" i="0" u="none" strike="noStrike" dirty="0">
+                        <a:rPr lang="en-US" sz="1000" b="1" i="0" u="none" strike="noStrike">
                           <a:solidFill>
                             <a:srgbClr val="000000"/>
                           </a:solidFill>
@@ -11617,7 +11426,7 @@
                   </a:ext>
                 </a:extLst>
               </a:tr>
-              <a:tr h="169019">
+              <a:tr h="190029">
                 <a:tc>
                   <a:txBody>
                     <a:bodyPr/>
@@ -12100,7 +11909,7 @@
                   </a:ext>
                 </a:extLst>
               </a:tr>
-              <a:tr h="169019">
+              <a:tr h="190029">
                 <a:tc>
                   <a:txBody>
                     <a:bodyPr/>
@@ -12583,7 +12392,7 @@
                   </a:ext>
                 </a:extLst>
               </a:tr>
-              <a:tr h="169019">
+              <a:tr h="190029">
                 <a:tc>
                   <a:txBody>
                     <a:bodyPr/>
@@ -13066,7 +12875,7 @@
                   </a:ext>
                 </a:extLst>
               </a:tr>
-              <a:tr h="169019">
+              <a:tr h="190029">
                 <a:tc>
                   <a:txBody>
                     <a:bodyPr/>
@@ -13549,7 +13358,7 @@
                   </a:ext>
                 </a:extLst>
               </a:tr>
-              <a:tr h="169019">
+              <a:tr h="190029">
                 <a:tc>
                   <a:txBody>
                     <a:bodyPr/>
@@ -14032,7 +13841,7 @@
                   </a:ext>
                 </a:extLst>
               </a:tr>
-              <a:tr h="169019">
+              <a:tr h="190029">
                 <a:tc>
                   <a:txBody>
                     <a:bodyPr/>
@@ -14515,7 +14324,7 @@
                   </a:ext>
                 </a:extLst>
               </a:tr>
-              <a:tr h="169019">
+              <a:tr h="190029">
                 <a:tc>
                   <a:txBody>
                     <a:bodyPr/>
@@ -14557,7 +14366,7 @@
                     <a:p>
                       <a:pPr algn="l" fontAlgn="b"/>
                       <a:r>
-                        <a:rPr lang="en-US" sz="1000" b="1" i="0" u="none" strike="noStrike" dirty="0">
+                        <a:rPr lang="en-US" sz="1000" b="1" i="0" u="none" strike="noStrike">
                           <a:solidFill>
                             <a:srgbClr val="000000"/>
                           </a:solidFill>
@@ -14998,7 +14807,7 @@
                   </a:ext>
                 </a:extLst>
               </a:tr>
-              <a:tr h="169019">
+              <a:tr h="190029">
                 <a:tc>
                   <a:txBody>
                     <a:bodyPr/>
@@ -15481,7 +15290,7 @@
                   </a:ext>
                 </a:extLst>
               </a:tr>
-              <a:tr h="169019">
+              <a:tr h="190029">
                 <a:tc>
                   <a:txBody>
                     <a:bodyPr/>
@@ -15964,7 +15773,7 @@
                   </a:ext>
                 </a:extLst>
               </a:tr>
-              <a:tr h="169019">
+              <a:tr h="190029">
                 <a:tc>
                   <a:txBody>
                     <a:bodyPr/>
@@ -16447,7 +16256,7 @@
                   </a:ext>
                 </a:extLst>
               </a:tr>
-              <a:tr h="169019">
+              <a:tr h="190029">
                 <a:tc>
                   <a:txBody>
                     <a:bodyPr/>
@@ -16930,7 +16739,7 @@
                   </a:ext>
                 </a:extLst>
               </a:tr>
-              <a:tr h="169019">
+              <a:tr h="190029">
                 <a:tc>
                   <a:txBody>
                     <a:bodyPr/>
@@ -17413,7 +17222,7 @@
                   </a:ext>
                 </a:extLst>
               </a:tr>
-              <a:tr h="169019">
+              <a:tr h="190029">
                 <a:tc>
                   <a:txBody>
                     <a:bodyPr/>
@@ -17896,7 +17705,7 @@
                   </a:ext>
                 </a:extLst>
               </a:tr>
-              <a:tr h="169019">
+              <a:tr h="190029">
                 <a:tc>
                   <a:txBody>
                     <a:bodyPr/>
@@ -19248,6 +19057,23 @@
 </file>
 
 <file path=customXml/item1.xml><?xml version="1.0" encoding="utf-8"?>
+<?mso-contentType ?>
+<FormTemplates xmlns="http://schemas.microsoft.com/sharepoint/v3/contenttype/forms">
+  <Display>DocumentLibraryForm</Display>
+  <Edit>DocumentLibraryForm</Edit>
+  <New>DocumentLibraryForm</New>
+</FormTemplates>
+</file>
+
+<file path=customXml/item2.xml><?xml version="1.0" encoding="utf-8"?>
+<p:properties xmlns:p="http://schemas.microsoft.com/office/2006/metadata/properties" xmlns:xsi="http://www.w3.org/2001/XMLSchema-instance" xmlns:pc="http://schemas.microsoft.com/office/infopath/2007/PartnerControls">
+  <documentManagement>
+    <Information xmlns="4ad138b4-2b68-4b70-945d-07f8f18b1c9a" xsi:nil="true"/>
+  </documentManagement>
+</p:properties>
+</file>
+
+<file path=customXml/item3.xml><?xml version="1.0" encoding="utf-8"?>
 <ct:contentTypeSchema xmlns:ct="http://schemas.microsoft.com/office/2006/metadata/contentType" xmlns:ma="http://schemas.microsoft.com/office/2006/metadata/properties/metaAttributes" ct:_="" ma:_="" ma:contentTypeName="Document" ma:contentTypeID="0x01010026DBA85F447B164191BB36C258697B67" ma:contentTypeVersion="14" ma:contentTypeDescription="Create a new document." ma:contentTypeScope="" ma:versionID="ea511d05ca7f895fe9556935b5c9af34">
   <xsd:schema xmlns:xsd="http://www.w3.org/2001/XMLSchema" xmlns:xs="http://www.w3.org/2001/XMLSchema" xmlns:p="http://schemas.microsoft.com/office/2006/metadata/properties" xmlns:ns2="4ad138b4-2b68-4b70-945d-07f8f18b1c9a" xmlns:ns3="3c474641-ec36-472f-b125-6b1b0910eaa4" targetNamespace="http://schemas.microsoft.com/office/2006/metadata/properties" ma:root="true" ma:fieldsID="662270106d7a7e100bcac2c5f8d29899" ns2:_="" ns3:_="">
     <xsd:import namespace="4ad138b4-2b68-4b70-945d-07f8f18b1c9a"/>
@@ -19472,24 +19298,32 @@
 </ct:contentTypeSchema>
 </file>
 
-<file path=customXml/item2.xml><?xml version="1.0" encoding="utf-8"?>
-<?mso-contentType ?>
-<FormTemplates xmlns="http://schemas.microsoft.com/sharepoint/v3/contenttype/forms">
-  <Display>DocumentLibraryForm</Display>
-  <Edit>DocumentLibraryForm</Edit>
-  <New>DocumentLibraryForm</New>
-</FormTemplates>
+<file path=customXml/itemProps1.xml><?xml version="1.0" encoding="utf-8"?>
+<ds:datastoreItem xmlns:ds="http://schemas.openxmlformats.org/officeDocument/2006/customXml" ds:itemID="{91C521DD-2673-4EE6-BB9B-DC5C3320FFBB}">
+  <ds:schemaRefs>
+    <ds:schemaRef ds:uri="http://schemas.microsoft.com/sharepoint/v3/contenttype/forms"/>
+  </ds:schemaRefs>
+</ds:datastoreItem>
 </file>
 
-<file path=customXml/item3.xml><?xml version="1.0" encoding="utf-8"?>
-<p:properties xmlns:p="http://schemas.microsoft.com/office/2006/metadata/properties" xmlns:xsi="http://www.w3.org/2001/XMLSchema-instance" xmlns:pc="http://schemas.microsoft.com/office/infopath/2007/PartnerControls">
-  <documentManagement>
-    <Information xmlns="4ad138b4-2b68-4b70-945d-07f8f18b1c9a" xsi:nil="true"/>
-  </documentManagement>
-</p:properties>
+<file path=customXml/itemProps2.xml><?xml version="1.0" encoding="utf-8"?>
+<ds:datastoreItem xmlns:ds="http://schemas.openxmlformats.org/officeDocument/2006/customXml" ds:itemID="{EDD1FC41-23C7-41B0-B5F9-BF4CD38AD2ED}">
+  <ds:schemaRefs>
+    <ds:schemaRef ds:uri="http://schemas.microsoft.com/office/infopath/2007/PartnerControls"/>
+    <ds:schemaRef ds:uri="3c474641-ec36-472f-b125-6b1b0910eaa4"/>
+    <ds:schemaRef ds:uri="http://purl.org/dc/terms/"/>
+    <ds:schemaRef ds:uri="http://schemas.microsoft.com/office/2006/documentManagement/types"/>
+    <ds:schemaRef ds:uri="http://www.w3.org/XML/1998/namespace"/>
+    <ds:schemaRef ds:uri="http://purl.org/dc/elements/1.1/"/>
+    <ds:schemaRef ds:uri="http://schemas.openxmlformats.org/package/2006/metadata/core-properties"/>
+    <ds:schemaRef ds:uri="4ad138b4-2b68-4b70-945d-07f8f18b1c9a"/>
+    <ds:schemaRef ds:uri="http://schemas.microsoft.com/office/2006/metadata/properties"/>
+    <ds:schemaRef ds:uri="http://purl.org/dc/dcmitype/"/>
+  </ds:schemaRefs>
+</ds:datastoreItem>
 </file>
 
-<file path=customXml/itemProps1.xml><?xml version="1.0" encoding="utf-8"?>
+<file path=customXml/itemProps3.xml><?xml version="1.0" encoding="utf-8"?>
 <ds:datastoreItem xmlns:ds="http://schemas.openxmlformats.org/officeDocument/2006/customXml" ds:itemID="{421B8C57-903D-4D0E-8336-7B512F760CD1}">
   <ds:schemaRefs>
     <ds:schemaRef ds:uri="http://schemas.microsoft.com/office/2006/metadata/contentType"/>
@@ -19506,29 +19340,4 @@
     <ds:schemaRef ds:uri="http://schemas.microsoft.com/internal/obd"/>
   </ds:schemaRefs>
 </ds:datastoreItem>
-</file>
-
-<file path=customXml/itemProps2.xml><?xml version="1.0" encoding="utf-8"?>
-<ds:datastoreItem xmlns:ds="http://schemas.openxmlformats.org/officeDocument/2006/customXml" ds:itemID="{91C521DD-2673-4EE6-BB9B-DC5C3320FFBB}">
-  <ds:schemaRefs>
-    <ds:schemaRef ds:uri="http://schemas.microsoft.com/sharepoint/v3/contenttype/forms"/>
-  </ds:schemaRefs>
-</ds:datastoreItem>
-</file>
-
-<file path=customXml/itemProps3.xml><?xml version="1.0" encoding="utf-8"?>
-<ds:datastoreItem xmlns:ds="http://schemas.openxmlformats.org/officeDocument/2006/customXml" ds:itemID="{EDD1FC41-23C7-41B0-B5F9-BF4CD38AD2ED}">
-  <ds:schemaRefs>
-    <ds:schemaRef ds:uri="http://schemas.microsoft.com/office/infopath/2007/PartnerControls"/>
-    <ds:schemaRef ds:uri="3c474641-ec36-472f-b125-6b1b0910eaa4"/>
-    <ds:schemaRef ds:uri="http://purl.org/dc/terms/"/>
-    <ds:schemaRef ds:uri="http://schemas.microsoft.com/office/2006/documentManagement/types"/>
-    <ds:schemaRef ds:uri="http://www.w3.org/XML/1998/namespace"/>
-    <ds:schemaRef ds:uri="http://purl.org/dc/elements/1.1/"/>
-    <ds:schemaRef ds:uri="http://schemas.openxmlformats.org/package/2006/metadata/core-properties"/>
-    <ds:schemaRef ds:uri="4ad138b4-2b68-4b70-945d-07f8f18b1c9a"/>
-    <ds:schemaRef ds:uri="http://schemas.microsoft.com/office/2006/metadata/properties"/>
-    <ds:schemaRef ds:uri="http://purl.org/dc/dcmitype/"/>
-  </ds:schemaRefs>
-</ds:datastoreItem>
 </file>
</xml_diff>